<commit_message>
Corrected problem with direct link to Jupyter notebook
</commit_message>
<xml_diff>
--- a/Analysis of Conversion Rates From Search Data.pptx
+++ b/Analysis of Conversion Rates From Search Data.pptx
@@ -107,6 +107,11 @@
       </a:defRPr>
     </a:lvl9pPr>
   </p:defaultTextStyle>
+  <p:extLst>
+    <p:ext uri="{EFAFB233-063F-42B5-8137-9DF3F51BA10A}">
+      <p15:sldGuideLst xmlns:p15="http://schemas.microsoft.com/office/powerpoint/2012/main"/>
+    </p:ext>
+  </p:extLst>
 </p:presentation>
 </file>
 
@@ -7642,40 +7647,40 @@
         </p:spPr>
         <p:txBody>
           <a:bodyPr anchor="ctr">
-            <a:normAutofit/>
+            <a:normAutofit lnSpcReduction="10000"/>
           </a:bodyPr>
           <a:lstStyle/>
           <a:p>
             <a:r>
-              <a:rPr lang="en-US" sz="2200"/>
+              <a:rPr lang="en-US" sz="2200" dirty="0"/>
               <a:t>Setup a </a:t>
             </a:r>
             <a:r>
-              <a:rPr lang="en-US" sz="2200" err="1"/>
+              <a:rPr lang="en-US" sz="2200" dirty="0" err="1"/>
               <a:t>Jupyter</a:t>
             </a:r>
             <a:r>
-              <a:rPr lang="en-US" sz="2200"/>
+              <a:rPr lang="en-US" sz="2200" dirty="0"/>
               <a:t> Notebook in a GitHub repository to perform research. Located here: </a:t>
             </a:r>
             <a:r>
-              <a:rPr lang="en-US" sz="2200">
+              <a:rPr lang="en-US" sz="2200" dirty="0">
                 <a:hlinkClick r:id="rId2"/>
               </a:rPr>
               <a:t>https://github.com/CYINT/lily-test</a:t>
             </a:r>
             <a:r>
-              <a:rPr lang="en-US" sz="2200"/>
+              <a:rPr lang="en-US" sz="2200" dirty="0"/>
               <a:t> </a:t>
             </a:r>
             <a:br>
-              <a:rPr lang="en-US" sz="2200"/>
+              <a:rPr lang="en-US" sz="2200" dirty="0"/>
             </a:br>
-            <a:endParaRPr lang="en-US" sz="2200"/>
+            <a:endParaRPr lang="en-US" sz="2200" dirty="0"/>
           </a:p>
           <a:p>
             <a:r>
-              <a:rPr lang="en-US" sz="2200"/>
+              <a:rPr lang="en-US" sz="2200" dirty="0"/>
               <a:t>Divided the problem into four steps:</a:t>
             </a:r>
           </a:p>
@@ -7684,7 +7689,7 @@
               <a:buNone/>
             </a:pPr>
             <a:r>
-              <a:rPr lang="en-US" sz="2200"/>
+              <a:rPr lang="en-US" sz="2200" dirty="0"/>
               <a:t>1. Load the data into pandas and conduct data exploration.  </a:t>
             </a:r>
           </a:p>
@@ -7693,7 +7698,7 @@
               <a:buNone/>
             </a:pPr>
             <a:r>
-              <a:rPr lang="en-US" sz="2200"/>
+              <a:rPr lang="en-US" sz="2200" dirty="0"/>
               <a:t>2. Calculate the Search to Product-View conversion rate.  </a:t>
             </a:r>
           </a:p>
@@ -7702,7 +7707,7 @@
               <a:buNone/>
             </a:pPr>
             <a:r>
-              <a:rPr lang="en-US" sz="2200"/>
+              <a:rPr lang="en-US" sz="2200" dirty="0"/>
               <a:t>3. Calculate the Product-View to Order-Complete conversion rate.  </a:t>
             </a:r>
           </a:p>
@@ -7711,38 +7716,38 @@
               <a:buNone/>
             </a:pPr>
             <a:r>
-              <a:rPr lang="en-US" sz="2200"/>
+              <a:rPr lang="en-US" sz="2200" dirty="0"/>
               <a:t>4. Form hypotheses about patterns in the data and test those hypotheses using appropriate data science techniques. </a:t>
             </a:r>
             <a:br>
-              <a:rPr lang="en-US" sz="2200"/>
+              <a:rPr lang="en-US" sz="2200" dirty="0"/>
             </a:br>
-            <a:endParaRPr lang="en-US" sz="2200"/>
+            <a:endParaRPr lang="en-US" sz="2200" dirty="0"/>
           </a:p>
           <a:p>
             <a:pPr marL="0" indent="0">
               <a:buNone/>
             </a:pPr>
             <a:r>
-              <a:rPr lang="en-US" sz="2200"/>
+              <a:rPr lang="en-US" sz="2200" dirty="0"/>
               <a:t>More details located in the </a:t>
             </a:r>
             <a:r>
-              <a:rPr lang="en-US" sz="2200" err="1"/>
+              <a:rPr lang="en-US" sz="2200" dirty="0" err="1"/>
               <a:t>Jupyter</a:t>
             </a:r>
             <a:r>
-              <a:rPr lang="en-US" sz="2200"/>
+              <a:rPr lang="en-US" sz="2200" dirty="0"/>
               <a:t> notebook found here: </a:t>
             </a:r>
             <a:r>
-              <a:rPr lang="en-US" sz="2200">
+              <a:rPr lang="en-US" sz="2200" dirty="0">
                 <a:hlinkClick r:id="rId3"/>
               </a:rPr>
-              <a:t>https://github.com/CYINT/lily-test/analysis.ipynb</a:t>
+              <a:t>https://github.com/CYINT/lily-test/blob/main/analysis.ipynb</a:t>
             </a:r>
             <a:r>
-              <a:rPr lang="en-US" sz="2200"/>
+              <a:rPr lang="en-US" sz="2200" dirty="0"/>
               <a:t> </a:t>
             </a:r>
           </a:p>

</xml_diff>